<commit_message>
doc: added final powerpoint
</commit_message>
<xml_diff>
--- a/notes.pptx
+++ b/notes.pptx
@@ -27,6 +27,7 @@
     <p:sldId id="275" r:id="rId21"/>
     <p:sldId id="276" r:id="rId22"/>
     <p:sldId id="277" r:id="rId23"/>
+    <p:sldId id="278" r:id="rId24"/>
   </p:sldIdLst>
   <p:sldSz cx="12192000" cy="6858000"/>
   <p:notesSz cx="6858000" cy="9144000"/>
@@ -282,7 +283,7 @@
           <a:p>
             <a:fld id="{82B64342-452D-41C5-B5B7-9DDCE6987F55}" type="datetimeFigureOut">
               <a:rPr lang="fr-FR" smtClean="0"/>
-              <a:t>30/11/2021</a:t>
+              <a:t>01/12/2021</a:t>
             </a:fld>
             <a:endParaRPr lang="fr-FR"/>
           </a:p>
@@ -482,7 +483,7 @@
           <a:p>
             <a:fld id="{82B64342-452D-41C5-B5B7-9DDCE6987F55}" type="datetimeFigureOut">
               <a:rPr lang="fr-FR" smtClean="0"/>
-              <a:t>30/11/2021</a:t>
+              <a:t>01/12/2021</a:t>
             </a:fld>
             <a:endParaRPr lang="fr-FR"/>
           </a:p>
@@ -692,7 +693,7 @@
           <a:p>
             <a:fld id="{82B64342-452D-41C5-B5B7-9DDCE6987F55}" type="datetimeFigureOut">
               <a:rPr lang="fr-FR" smtClean="0"/>
-              <a:t>30/11/2021</a:t>
+              <a:t>01/12/2021</a:t>
             </a:fld>
             <a:endParaRPr lang="fr-FR"/>
           </a:p>
@@ -892,7 +893,7 @@
           <a:p>
             <a:fld id="{82B64342-452D-41C5-B5B7-9DDCE6987F55}" type="datetimeFigureOut">
               <a:rPr lang="fr-FR" smtClean="0"/>
-              <a:t>30/11/2021</a:t>
+              <a:t>01/12/2021</a:t>
             </a:fld>
             <a:endParaRPr lang="fr-FR"/>
           </a:p>
@@ -1168,7 +1169,7 @@
           <a:p>
             <a:fld id="{82B64342-452D-41C5-B5B7-9DDCE6987F55}" type="datetimeFigureOut">
               <a:rPr lang="fr-FR" smtClean="0"/>
-              <a:t>30/11/2021</a:t>
+              <a:t>01/12/2021</a:t>
             </a:fld>
             <a:endParaRPr lang="fr-FR"/>
           </a:p>
@@ -1436,7 +1437,7 @@
           <a:p>
             <a:fld id="{82B64342-452D-41C5-B5B7-9DDCE6987F55}" type="datetimeFigureOut">
               <a:rPr lang="fr-FR" smtClean="0"/>
-              <a:t>30/11/2021</a:t>
+              <a:t>01/12/2021</a:t>
             </a:fld>
             <a:endParaRPr lang="fr-FR"/>
           </a:p>
@@ -1851,7 +1852,7 @@
           <a:p>
             <a:fld id="{82B64342-452D-41C5-B5B7-9DDCE6987F55}" type="datetimeFigureOut">
               <a:rPr lang="fr-FR" smtClean="0"/>
-              <a:t>30/11/2021</a:t>
+              <a:t>01/12/2021</a:t>
             </a:fld>
             <a:endParaRPr lang="fr-FR"/>
           </a:p>
@@ -1993,7 +1994,7 @@
           <a:p>
             <a:fld id="{82B64342-452D-41C5-B5B7-9DDCE6987F55}" type="datetimeFigureOut">
               <a:rPr lang="fr-FR" smtClean="0"/>
-              <a:t>30/11/2021</a:t>
+              <a:t>01/12/2021</a:t>
             </a:fld>
             <a:endParaRPr lang="fr-FR"/>
           </a:p>
@@ -2106,7 +2107,7 @@
           <a:p>
             <a:fld id="{82B64342-452D-41C5-B5B7-9DDCE6987F55}" type="datetimeFigureOut">
               <a:rPr lang="fr-FR" smtClean="0"/>
-              <a:t>30/11/2021</a:t>
+              <a:t>01/12/2021</a:t>
             </a:fld>
             <a:endParaRPr lang="fr-FR"/>
           </a:p>
@@ -2419,7 +2420,7 @@
           <a:p>
             <a:fld id="{82B64342-452D-41C5-B5B7-9DDCE6987F55}" type="datetimeFigureOut">
               <a:rPr lang="fr-FR" smtClean="0"/>
-              <a:t>30/11/2021</a:t>
+              <a:t>01/12/2021</a:t>
             </a:fld>
             <a:endParaRPr lang="fr-FR"/>
           </a:p>
@@ -2708,7 +2709,7 @@
           <a:p>
             <a:fld id="{82B64342-452D-41C5-B5B7-9DDCE6987F55}" type="datetimeFigureOut">
               <a:rPr lang="fr-FR" smtClean="0"/>
-              <a:t>30/11/2021</a:t>
+              <a:t>01/12/2021</a:t>
             </a:fld>
             <a:endParaRPr lang="fr-FR"/>
           </a:p>
@@ -2951,7 +2952,7 @@
           <a:p>
             <a:fld id="{82B64342-452D-41C5-B5B7-9DDCE6987F55}" type="datetimeFigureOut">
               <a:rPr lang="fr-FR" smtClean="0"/>
-              <a:t>30/11/2021</a:t>
+              <a:t>01/12/2021</a:t>
             </a:fld>
             <a:endParaRPr lang="fr-FR"/>
           </a:p>
@@ -9706,7 +9707,7 @@
         </p:nvSpPr>
         <p:spPr>
           <a:xfrm>
-            <a:off x="9073299" y="3068425"/>
+            <a:off x="8761925" y="2911386"/>
             <a:ext cx="868507" cy="369332"/>
           </a:xfrm>
           <a:prstGeom prst="rect">
@@ -10184,10 +10185,197 @@
           </a:p>
         </p:txBody>
       </p:sp>
+      <p:cxnSp>
+        <p:nvCxnSpPr>
+          <p:cNvPr id="31" name="Straight Connector 30">
+            <a:extLst>
+              <a:ext uri="{FF2B5EF4-FFF2-40B4-BE49-F238E27FC236}">
+                <a16:creationId xmlns:a16="http://schemas.microsoft.com/office/drawing/2014/main" id="{8251258E-F87D-4EF6-919C-E8161E289EF7}"/>
+              </a:ext>
+            </a:extLst>
+          </p:cNvPr>
+          <p:cNvCxnSpPr/>
+          <p:nvPr/>
+        </p:nvCxnSpPr>
+        <p:spPr>
+          <a:xfrm>
+            <a:off x="9726891" y="2201159"/>
+            <a:ext cx="0" cy="748199"/>
+          </a:xfrm>
+          <a:prstGeom prst="line">
+            <a:avLst/>
+          </a:prstGeom>
+          <a:ln w="76200"/>
+        </p:spPr>
+        <p:style>
+          <a:lnRef idx="1">
+            <a:schemeClr val="accent1"/>
+          </a:lnRef>
+          <a:fillRef idx="0">
+            <a:schemeClr val="accent1"/>
+          </a:fillRef>
+          <a:effectRef idx="0">
+            <a:schemeClr val="accent1"/>
+          </a:effectRef>
+          <a:fontRef idx="minor">
+            <a:schemeClr val="tx1"/>
+          </a:fontRef>
+        </p:style>
+      </p:cxnSp>
+      <p:sp>
+        <p:nvSpPr>
+          <p:cNvPr id="3" name="TextBox 2">
+            <a:extLst>
+              <a:ext uri="{FF2B5EF4-FFF2-40B4-BE49-F238E27FC236}">
+                <a16:creationId xmlns:a16="http://schemas.microsoft.com/office/drawing/2014/main" id="{BC3505B7-4787-4C4E-86AD-9B3C04C74736}"/>
+              </a:ext>
+            </a:extLst>
+          </p:cNvPr>
+          <p:cNvSpPr txBox="1"/>
+          <p:nvPr/>
+        </p:nvSpPr>
+        <p:spPr>
+          <a:xfrm>
+            <a:off x="9630432" y="3429000"/>
+            <a:ext cx="868507" cy="646331"/>
+          </a:xfrm>
+          <a:prstGeom prst="rect">
+            <a:avLst/>
+          </a:prstGeom>
+          <a:noFill/>
+        </p:spPr>
+        <p:txBody>
+          <a:bodyPr wrap="none" rtlCol="0">
+            <a:spAutoFit/>
+          </a:bodyPr>
+          <a:lstStyle/>
+          <a:p>
+            <a:r>
+              <a:rPr lang="fr-FR" dirty="0"/>
+              <a:t>ES2017</a:t>
+            </a:r>
+          </a:p>
+          <a:p>
+            <a:r>
+              <a:rPr lang="fr-FR" dirty="0" err="1"/>
+              <a:t>await</a:t>
+            </a:r>
+            <a:endParaRPr lang="fr-FR" dirty="0"/>
+          </a:p>
+        </p:txBody>
+      </p:sp>
     </p:spTree>
     <p:extLst>
       <p:ext uri="{BB962C8B-B14F-4D97-AF65-F5344CB8AC3E}">
         <p14:creationId xmlns:p14="http://schemas.microsoft.com/office/powerpoint/2010/main" val="804213286"/>
+      </p:ext>
+    </p:extLst>
+  </p:cSld>
+  <p:clrMapOvr>
+    <a:masterClrMapping/>
+  </p:clrMapOvr>
+</p:sld>
+</file>
+
+<file path=ppt/slides/slide23.xml><?xml version="1.0" encoding="utf-8"?>
+<p:sld xmlns:a="http://schemas.openxmlformats.org/drawingml/2006/main" xmlns:r="http://schemas.openxmlformats.org/officeDocument/2006/relationships" xmlns:p="http://schemas.openxmlformats.org/presentationml/2006/main">
+  <p:cSld>
+    <p:spTree>
+      <p:nvGrpSpPr>
+        <p:cNvPr id="1" name=""/>
+        <p:cNvGrpSpPr/>
+        <p:nvPr/>
+      </p:nvGrpSpPr>
+      <p:grpSpPr>
+        <a:xfrm>
+          <a:off x="0" y="0"/>
+          <a:ext cx="0" cy="0"/>
+          <a:chOff x="0" y="0"/>
+          <a:chExt cx="0" cy="0"/>
+        </a:xfrm>
+      </p:grpSpPr>
+      <p:sp>
+        <p:nvSpPr>
+          <p:cNvPr id="2" name="Title 1">
+            <a:extLst>
+              <a:ext uri="{FF2B5EF4-FFF2-40B4-BE49-F238E27FC236}">
+                <a16:creationId xmlns:a16="http://schemas.microsoft.com/office/drawing/2014/main" id="{4B805405-3371-467F-B2E9-CEF4C66935D4}"/>
+              </a:ext>
+            </a:extLst>
+          </p:cNvPr>
+          <p:cNvSpPr>
+            <a:spLocks noGrp="1"/>
+          </p:cNvSpPr>
+          <p:nvPr>
+            <p:ph type="title"/>
+          </p:nvPr>
+        </p:nvSpPr>
+        <p:spPr/>
+        <p:txBody>
+          <a:bodyPr/>
+          <a:lstStyle/>
+          <a:p>
+            <a:r>
+              <a:rPr lang="fr-FR" dirty="0" err="1"/>
+              <a:t>Todo</a:t>
+            </a:r>
+            <a:endParaRPr lang="fr-FR" dirty="0"/>
+          </a:p>
+        </p:txBody>
+      </p:sp>
+      <p:sp>
+        <p:nvSpPr>
+          <p:cNvPr id="3" name="Content Placeholder 2">
+            <a:extLst>
+              <a:ext uri="{FF2B5EF4-FFF2-40B4-BE49-F238E27FC236}">
+                <a16:creationId xmlns:a16="http://schemas.microsoft.com/office/drawing/2014/main" id="{A268EE69-F1D5-41F7-89AA-3800246F7A28}"/>
+              </a:ext>
+            </a:extLst>
+          </p:cNvPr>
+          <p:cNvSpPr>
+            <a:spLocks noGrp="1"/>
+          </p:cNvSpPr>
+          <p:nvPr>
+            <p:ph idx="1"/>
+          </p:nvPr>
+        </p:nvSpPr>
+        <p:spPr/>
+        <p:txBody>
+          <a:bodyPr/>
+          <a:lstStyle/>
+          <a:p>
+            <a:r>
+              <a:rPr lang="fr-FR" dirty="0" err="1"/>
+              <a:t>Cypress</a:t>
+            </a:r>
+            <a:endParaRPr lang="fr-FR" dirty="0"/>
+          </a:p>
+          <a:p>
+            <a:r>
+              <a:rPr lang="fr-FR" dirty="0" err="1"/>
+              <a:t>Loading</a:t>
+            </a:r>
+            <a:r>
+              <a:rPr lang="fr-FR" dirty="0"/>
+              <a:t> skeleton</a:t>
+            </a:r>
+          </a:p>
+          <a:p>
+            <a:r>
+              <a:rPr lang="fr-FR" dirty="0" err="1"/>
+              <a:t>Layout</a:t>
+            </a:r>
+            <a:r>
+              <a:rPr lang="fr-FR"/>
+              <a:t> par carte</a:t>
+            </a:r>
+          </a:p>
+        </p:txBody>
+      </p:sp>
+    </p:spTree>
+    <p:extLst>
+      <p:ext uri="{BB962C8B-B14F-4D97-AF65-F5344CB8AC3E}">
+        <p14:creationId xmlns:p14="http://schemas.microsoft.com/office/powerpoint/2010/main" val="2866006680"/>
       </p:ext>
     </p:extLst>
   </p:cSld>
@@ -10818,6 +11006,18 @@
             <a:endParaRPr lang="fr-FR" dirty="0"/>
           </a:p>
           <a:p>
+            <a:r>
+              <a:rPr lang="fr-FR" dirty="0">
+                <a:hlinkClick r:id="rId7"/>
+              </a:rPr>
+              <a:t>http://es6-features.org/#Constants</a:t>
+            </a:r>
+            <a:endParaRPr lang="fr-FR" dirty="0"/>
+          </a:p>
+          <a:p>
+            <a:endParaRPr lang="fr-FR" dirty="0"/>
+          </a:p>
+          <a:p>
             <a:endParaRPr lang="fr-FR" dirty="0"/>
           </a:p>
           <a:p>
@@ -10911,7 +11111,9 @@
         </p:nvSpPr>
         <p:spPr/>
         <p:txBody>
-          <a:bodyPr/>
+          <a:bodyPr>
+            <a:normAutofit fontScale="92500" lnSpcReduction="20000"/>
+          </a:bodyPr>
           <a:lstStyle/>
           <a:p>
             <a:r>
@@ -10993,6 +11195,24 @@
             <a:r>
               <a:rPr lang="fr-FR" dirty="0" err="1"/>
               <a:t>Surround</a:t>
+            </a:r>
+            <a:endParaRPr lang="fr-FR" dirty="0"/>
+          </a:p>
+          <a:p>
+            <a:r>
+              <a:rPr lang="fr-FR" dirty="0"/>
+              <a:t>Typescript Class </a:t>
+            </a:r>
+            <a:r>
+              <a:rPr lang="fr-FR" dirty="0" err="1"/>
+              <a:t>Organizer</a:t>
+            </a:r>
+            <a:endParaRPr lang="fr-FR" dirty="0"/>
+          </a:p>
+          <a:p>
+            <a:r>
+              <a:rPr lang="en-US" dirty="0"/>
+              <a:t>Bracket Pair Colorizer 2</a:t>
             </a:r>
             <a:endParaRPr lang="fr-FR" dirty="0"/>
           </a:p>

</xml_diff>